<commit_message>
PPT update, schematic and board layout
</commit_message>
<xml_diff>
--- a/VPS Design.pptx
+++ b/VPS Design.pptx
@@ -9,7 +9,9 @@
     <p:sldId id="260" r:id="rId3"/>
     <p:sldId id="258" r:id="rId4"/>
     <p:sldId id="259" r:id="rId5"/>
-    <p:sldId id="262" r:id="rId6"/>
+    <p:sldId id="264" r:id="rId6"/>
+    <p:sldId id="262" r:id="rId7"/>
+    <p:sldId id="263" r:id="rId8"/>
   </p:sldIdLst>
   <p:sldSz cx="12192000" cy="6858000"/>
   <p:notesSz cx="6858000" cy="9144000"/>
@@ -620,7 +622,7 @@
                 <a16:creationId xmlns:a16="http://schemas.microsoft.com/office/drawing/2014/main" id="{C05729A4-6F0F-4423-AD0C-EF27345E6187}"/>
               </a:ext>
               <a:ext uri="{C183D7F6-B498-43B3-948B-1728B52AA6E4}">
-                <adec:decorative xmlns:adec="http://schemas.microsoft.com/office/drawing/2017/decorative" val="1"/>
+                <adec:decorative xmlns:adec="http://schemas.microsoft.com/office/drawing/2017/decorative" xmlns="" val="1"/>
               </a:ext>
             </a:extLst>
           </p:cNvPr>
@@ -674,7 +676,7 @@
                 <a16:creationId xmlns:a16="http://schemas.microsoft.com/office/drawing/2014/main" id="{204CB79E-F775-42E6-994C-D5FA8C176B65}"/>
               </a:ext>
               <a:ext uri="{C183D7F6-B498-43B3-948B-1728B52AA6E4}">
-                <adec:decorative xmlns:adec="http://schemas.microsoft.com/office/drawing/2017/decorative" val="1"/>
+                <adec:decorative xmlns:adec="http://schemas.microsoft.com/office/drawing/2017/decorative" xmlns="" val="1"/>
               </a:ext>
             </a:extLst>
           </p:cNvPr>
@@ -728,7 +730,7 @@
                 <a16:creationId xmlns:a16="http://schemas.microsoft.com/office/drawing/2014/main" id="{3AAB5B94-95EF-4963-859C-1FA406D62CA2}"/>
               </a:ext>
               <a:ext uri="{C183D7F6-B498-43B3-948B-1728B52AA6E4}">
-                <adec:decorative xmlns:adec="http://schemas.microsoft.com/office/drawing/2017/decorative" val="1"/>
+                <adec:decorative xmlns:adec="http://schemas.microsoft.com/office/drawing/2017/decorative" xmlns="" val="1"/>
               </a:ext>
             </a:extLst>
           </p:cNvPr>
@@ -3729,10 +3731,730 @@
           <a:chExt cx="0" cy="0"/>
         </a:xfrm>
       </p:grpSpPr>
+      <p:pic>
+        <p:nvPicPr>
+          <p:cNvPr id="10" name="Picture 9"/>
+          <p:cNvPicPr>
+            <a:picLocks noChangeAspect="1"/>
+          </p:cNvPicPr>
+          <p:nvPr/>
+        </p:nvPicPr>
+        <p:blipFill>
+          <a:blip r:embed="rId2"/>
+          <a:stretch>
+            <a:fillRect/>
+          </a:stretch>
+        </p:blipFill>
+        <p:spPr>
+          <a:xfrm>
+            <a:off x="1385147" y="1377305"/>
+            <a:ext cx="3565774" cy="2044377"/>
+          </a:xfrm>
+          <a:prstGeom prst="rect">
+            <a:avLst/>
+          </a:prstGeom>
+        </p:spPr>
+      </p:pic>
+      <p:sp>
+        <p:nvSpPr>
+          <p:cNvPr id="11" name="Rectangle 10">
+            <a:extLst>
+              <a:ext uri="{FF2B5EF4-FFF2-40B4-BE49-F238E27FC236}">
+                <a16:creationId xmlns:a16="http://schemas.microsoft.com/office/drawing/2014/main" id="{F27698DC-E0ED-5B45-818E-C9EF17371C56}"/>
+              </a:ext>
+            </a:extLst>
+          </p:cNvPr>
+          <p:cNvSpPr/>
+          <p:nvPr/>
+        </p:nvSpPr>
+        <p:spPr>
+          <a:xfrm>
+            <a:off x="1385147" y="3799047"/>
+            <a:ext cx="9852348" cy="1646854"/>
+          </a:xfrm>
+          <a:prstGeom prst="rect">
+            <a:avLst/>
+          </a:prstGeom>
+          <a:solidFill>
+            <a:schemeClr val="accent3">
+              <a:lumMod val="75000"/>
+            </a:schemeClr>
+          </a:solidFill>
+          <a:ln>
+            <a:noFill/>
+          </a:ln>
+        </p:spPr>
+        <p:style>
+          <a:lnRef idx="2">
+            <a:schemeClr val="accent1">
+              <a:shade val="50000"/>
+            </a:schemeClr>
+          </a:lnRef>
+          <a:fillRef idx="1">
+            <a:schemeClr val="accent1"/>
+          </a:fillRef>
+          <a:effectRef idx="0">
+            <a:schemeClr val="accent1"/>
+          </a:effectRef>
+          <a:fontRef idx="minor">
+            <a:schemeClr val="lt1"/>
+          </a:fontRef>
+        </p:style>
+        <p:txBody>
+          <a:bodyPr rtlCol="0" anchor="ctr"/>
+          <a:lstStyle/>
+          <a:p>
+            <a:pPr algn="ctr"/>
+            <a:r>
+              <a:rPr lang="en-US" sz="5400" dirty="0">
+                <a:solidFill>
+                  <a:schemeClr val="bg1"/>
+                </a:solidFill>
+              </a:rPr>
+              <a:t>Unregulated </a:t>
+            </a:r>
+            <a:r>
+              <a:rPr lang="en-US" sz="5400" dirty="0" smtClean="0">
+                <a:solidFill>
+                  <a:schemeClr val="bg1"/>
+                </a:solidFill>
+              </a:rPr>
+              <a:t>Power Source</a:t>
+            </a:r>
+            <a:endParaRPr lang="en-US" sz="5400" dirty="0">
+              <a:solidFill>
+                <a:schemeClr val="bg1"/>
+              </a:solidFill>
+            </a:endParaRPr>
+          </a:p>
+        </p:txBody>
+      </p:sp>
+    </p:spTree>
+    <p:extLst>
+      <p:ext uri="{BB962C8B-B14F-4D97-AF65-F5344CB8AC3E}">
+        <p14:creationId xmlns:p14="http://schemas.microsoft.com/office/powerpoint/2010/main" val="2021099345"/>
+      </p:ext>
+    </p:extLst>
+  </p:cSld>
+  <p:clrMapOvr>
+    <a:masterClrMapping/>
+  </p:clrMapOvr>
+</p:sld>
+</file>
+
+<file path=ppt/slides/slide6.xml><?xml version="1.0" encoding="utf-8"?>
+<p:sld xmlns:a="http://schemas.openxmlformats.org/drawingml/2006/main" xmlns:r="http://schemas.openxmlformats.org/officeDocument/2006/relationships" xmlns:p="http://schemas.openxmlformats.org/presentationml/2006/main">
+  <p:cSld>
+    <p:spTree>
+      <p:nvGrpSpPr>
+        <p:cNvPr id="1" name=""/>
+        <p:cNvGrpSpPr/>
+        <p:nvPr/>
+      </p:nvGrpSpPr>
+      <p:grpSpPr>
+        <a:xfrm>
+          <a:off x="0" y="0"/>
+          <a:ext cx="0" cy="0"/>
+          <a:chOff x="0" y="0"/>
+          <a:chExt cx="0" cy="0"/>
+        </a:xfrm>
+      </p:grpSpPr>
+      <p:pic>
+        <p:nvPicPr>
+          <p:cNvPr id="2" name="Picture 1"/>
+          <p:cNvPicPr>
+            <a:picLocks noChangeAspect="1"/>
+          </p:cNvPicPr>
+          <p:nvPr/>
+        </p:nvPicPr>
+        <p:blipFill>
+          <a:blip r:embed="rId2"/>
+          <a:stretch>
+            <a:fillRect/>
+          </a:stretch>
+        </p:blipFill>
+        <p:spPr>
+          <a:xfrm>
+            <a:off x="2095500" y="1192144"/>
+            <a:ext cx="6707605" cy="5030704"/>
+          </a:xfrm>
+          <a:prstGeom prst="rect">
+            <a:avLst/>
+          </a:prstGeom>
+        </p:spPr>
+      </p:pic>
+      <p:sp>
+        <p:nvSpPr>
+          <p:cNvPr id="12" name="Rectangle 11">
+            <a:extLst>
+              <a:ext uri="{FF2B5EF4-FFF2-40B4-BE49-F238E27FC236}">
+                <a16:creationId xmlns:a16="http://schemas.microsoft.com/office/drawing/2014/main" id="{F27698DC-E0ED-5B45-818E-C9EF17371C56}"/>
+              </a:ext>
+            </a:extLst>
+          </p:cNvPr>
+          <p:cNvSpPr/>
+          <p:nvPr/>
+        </p:nvSpPr>
+        <p:spPr>
+          <a:xfrm>
+            <a:off x="0" y="158651"/>
+            <a:ext cx="12192000" cy="407406"/>
+          </a:xfrm>
+          <a:prstGeom prst="rect">
+            <a:avLst/>
+          </a:prstGeom>
+          <a:solidFill>
+            <a:schemeClr val="accent3">
+              <a:lumMod val="75000"/>
+            </a:schemeClr>
+          </a:solidFill>
+          <a:ln>
+            <a:noFill/>
+          </a:ln>
+        </p:spPr>
+        <p:style>
+          <a:lnRef idx="2">
+            <a:schemeClr val="accent1">
+              <a:shade val="50000"/>
+            </a:schemeClr>
+          </a:lnRef>
+          <a:fillRef idx="1">
+            <a:schemeClr val="accent1"/>
+          </a:fillRef>
+          <a:effectRef idx="0">
+            <a:schemeClr val="accent1"/>
+          </a:effectRef>
+          <a:fontRef idx="minor">
+            <a:schemeClr val="lt1"/>
+          </a:fontRef>
+        </p:style>
+        <p:txBody>
+          <a:bodyPr rtlCol="0" anchor="ctr"/>
+          <a:lstStyle/>
+          <a:p>
+            <a:pPr algn="ctr"/>
+            <a:r>
+              <a:rPr lang="en-US" sz="2400" dirty="0">
+                <a:solidFill>
+                  <a:schemeClr val="bg1"/>
+                </a:solidFill>
+              </a:rPr>
+              <a:t>Unregulated </a:t>
+            </a:r>
+            <a:r>
+              <a:rPr lang="en-US" sz="2400" dirty="0" smtClean="0">
+                <a:solidFill>
+                  <a:schemeClr val="bg1"/>
+                </a:solidFill>
+              </a:rPr>
+              <a:t>Power Source</a:t>
+            </a:r>
+            <a:endParaRPr lang="en-US" sz="2400" dirty="0">
+              <a:solidFill>
+                <a:schemeClr val="bg1"/>
+              </a:solidFill>
+            </a:endParaRPr>
+          </a:p>
+        </p:txBody>
+      </p:sp>
+      <p:sp>
+        <p:nvSpPr>
+          <p:cNvPr id="13" name="TextBox 12"/>
+          <p:cNvSpPr txBox="1"/>
+          <p:nvPr/>
+        </p:nvSpPr>
+        <p:spPr>
+          <a:xfrm>
+            <a:off x="1397000" y="2794000"/>
+            <a:ext cx="1397000" cy="369332"/>
+          </a:xfrm>
+          <a:prstGeom prst="rect">
+            <a:avLst/>
+          </a:prstGeom>
+          <a:noFill/>
+        </p:spPr>
+        <p:txBody>
+          <a:bodyPr wrap="square" rtlCol="0">
+            <a:spAutoFit/>
+          </a:bodyPr>
+          <a:lstStyle/>
+          <a:p>
+            <a:r>
+              <a:rPr lang="en-US" dirty="0" smtClean="0"/>
+              <a:t>240 V AC</a:t>
+            </a:r>
+            <a:endParaRPr lang="en-US" dirty="0"/>
+          </a:p>
+        </p:txBody>
+      </p:sp>
+      <p:sp>
+        <p:nvSpPr>
+          <p:cNvPr id="14" name="TextBox 13"/>
+          <p:cNvSpPr txBox="1"/>
+          <p:nvPr/>
+        </p:nvSpPr>
+        <p:spPr>
+          <a:xfrm>
+            <a:off x="3263900" y="1638300"/>
+            <a:ext cx="1397000" cy="369332"/>
+          </a:xfrm>
+          <a:prstGeom prst="rect">
+            <a:avLst/>
+          </a:prstGeom>
+          <a:noFill/>
+        </p:spPr>
+        <p:txBody>
+          <a:bodyPr wrap="square" rtlCol="0">
+            <a:spAutoFit/>
+          </a:bodyPr>
+          <a:lstStyle/>
+          <a:p>
+            <a:r>
+              <a:rPr lang="en-US" dirty="0" smtClean="0"/>
+              <a:t>30-0-30, 3A</a:t>
+            </a:r>
+            <a:endParaRPr lang="en-US" dirty="0"/>
+          </a:p>
+        </p:txBody>
+      </p:sp>
+      <p:sp>
+        <p:nvSpPr>
+          <p:cNvPr id="15" name="TextBox 14"/>
+          <p:cNvSpPr txBox="1"/>
+          <p:nvPr/>
+        </p:nvSpPr>
+        <p:spPr>
+          <a:xfrm>
+            <a:off x="3454400" y="3522830"/>
+            <a:ext cx="1397000" cy="369332"/>
+          </a:xfrm>
+          <a:prstGeom prst="rect">
+            <a:avLst/>
+          </a:prstGeom>
+          <a:noFill/>
+        </p:spPr>
+        <p:txBody>
+          <a:bodyPr wrap="square" rtlCol="0">
+            <a:spAutoFit/>
+          </a:bodyPr>
+          <a:lstStyle/>
+          <a:p>
+            <a:r>
+              <a:rPr lang="en-US" dirty="0" smtClean="0"/>
+              <a:t>0-12, 1A</a:t>
+            </a:r>
+            <a:endParaRPr lang="en-US" dirty="0"/>
+          </a:p>
+        </p:txBody>
+      </p:sp>
     </p:spTree>
     <p:extLst>
       <p:ext uri="{BB962C8B-B14F-4D97-AF65-F5344CB8AC3E}">
         <p14:creationId xmlns:p14="http://schemas.microsoft.com/office/powerpoint/2010/main" val="3237989051"/>
+      </p:ext>
+    </p:extLst>
+  </p:cSld>
+  <p:clrMapOvr>
+    <a:masterClrMapping/>
+  </p:clrMapOvr>
+</p:sld>
+</file>
+
+<file path=ppt/slides/slide7.xml><?xml version="1.0" encoding="utf-8"?>
+<p:sld xmlns:a="http://schemas.openxmlformats.org/drawingml/2006/main" xmlns:r="http://schemas.openxmlformats.org/officeDocument/2006/relationships" xmlns:p="http://schemas.openxmlformats.org/presentationml/2006/main">
+  <p:cSld>
+    <p:spTree>
+      <p:nvGrpSpPr>
+        <p:cNvPr id="1" name=""/>
+        <p:cNvGrpSpPr/>
+        <p:nvPr/>
+      </p:nvGrpSpPr>
+      <p:grpSpPr>
+        <a:xfrm>
+          <a:off x="0" y="0"/>
+          <a:ext cx="0" cy="0"/>
+          <a:chOff x="0" y="0"/>
+          <a:chExt cx="0" cy="0"/>
+        </a:xfrm>
+      </p:grpSpPr>
+      <p:sp>
+        <p:nvSpPr>
+          <p:cNvPr id="5" name="Rectangle 4">
+            <a:extLst>
+              <a:ext uri="{FF2B5EF4-FFF2-40B4-BE49-F238E27FC236}">
+                <a16:creationId xmlns:a16="http://schemas.microsoft.com/office/drawing/2014/main" id="{F27698DC-E0ED-5B45-818E-C9EF17371C56}"/>
+              </a:ext>
+            </a:extLst>
+          </p:cNvPr>
+          <p:cNvSpPr/>
+          <p:nvPr/>
+        </p:nvSpPr>
+        <p:spPr>
+          <a:xfrm>
+            <a:off x="0" y="158651"/>
+            <a:ext cx="12192000" cy="407406"/>
+          </a:xfrm>
+          <a:prstGeom prst="rect">
+            <a:avLst/>
+          </a:prstGeom>
+          <a:solidFill>
+            <a:schemeClr val="accent3">
+              <a:lumMod val="75000"/>
+            </a:schemeClr>
+          </a:solidFill>
+          <a:ln>
+            <a:noFill/>
+          </a:ln>
+        </p:spPr>
+        <p:style>
+          <a:lnRef idx="2">
+            <a:schemeClr val="accent1">
+              <a:shade val="50000"/>
+            </a:schemeClr>
+          </a:lnRef>
+          <a:fillRef idx="1">
+            <a:schemeClr val="accent1"/>
+          </a:fillRef>
+          <a:effectRef idx="0">
+            <a:schemeClr val="accent1"/>
+          </a:effectRef>
+          <a:fontRef idx="minor">
+            <a:schemeClr val="lt1"/>
+          </a:fontRef>
+        </p:style>
+        <p:txBody>
+          <a:bodyPr rtlCol="0" anchor="ctr"/>
+          <a:lstStyle/>
+          <a:p>
+            <a:pPr algn="ctr"/>
+            <a:r>
+              <a:rPr lang="en-US" sz="2400" dirty="0">
+                <a:solidFill>
+                  <a:schemeClr val="bg1"/>
+                </a:solidFill>
+              </a:rPr>
+              <a:t>Unregulated </a:t>
+            </a:r>
+            <a:r>
+              <a:rPr lang="en-US" sz="2400" dirty="0" smtClean="0">
+                <a:solidFill>
+                  <a:schemeClr val="bg1"/>
+                </a:solidFill>
+              </a:rPr>
+              <a:t>Power Source</a:t>
+            </a:r>
+            <a:endParaRPr lang="en-US" sz="2400" dirty="0">
+              <a:solidFill>
+                <a:schemeClr val="bg1"/>
+              </a:solidFill>
+            </a:endParaRPr>
+          </a:p>
+        </p:txBody>
+      </p:sp>
+      <p:pic>
+        <p:nvPicPr>
+          <p:cNvPr id="12" name="Picture 11"/>
+          <p:cNvPicPr>
+            <a:picLocks noChangeAspect="1"/>
+          </p:cNvPicPr>
+          <p:nvPr/>
+        </p:nvPicPr>
+        <p:blipFill>
+          <a:blip r:embed="rId2">
+            <a:extLst>
+              <a:ext uri="{28A0092B-C50C-407E-A947-70E740481C1C}">
+                <a14:useLocalDpi xmlns:a14="http://schemas.microsoft.com/office/drawing/2010/main" val="0"/>
+              </a:ext>
+            </a:extLst>
+          </a:blip>
+          <a:stretch>
+            <a:fillRect/>
+          </a:stretch>
+        </p:blipFill>
+        <p:spPr>
+          <a:xfrm>
+            <a:off x="1587501" y="1017812"/>
+            <a:ext cx="3898900" cy="5226025"/>
+          </a:xfrm>
+          <a:prstGeom prst="rect">
+            <a:avLst/>
+          </a:prstGeom>
+        </p:spPr>
+      </p:pic>
+      <p:pic>
+        <p:nvPicPr>
+          <p:cNvPr id="13" name="Picture 12"/>
+          <p:cNvPicPr>
+            <a:picLocks noChangeAspect="1"/>
+          </p:cNvPicPr>
+          <p:nvPr/>
+        </p:nvPicPr>
+        <p:blipFill>
+          <a:blip r:embed="rId3">
+            <a:extLst>
+              <a:ext uri="{28A0092B-C50C-407E-A947-70E740481C1C}">
+                <a14:useLocalDpi xmlns:a14="http://schemas.microsoft.com/office/drawing/2010/main" val="0"/>
+              </a:ext>
+            </a:extLst>
+          </a:blip>
+          <a:stretch>
+            <a:fillRect/>
+          </a:stretch>
+        </p:blipFill>
+        <p:spPr>
+          <a:xfrm>
+            <a:off x="6757890" y="1017812"/>
+            <a:ext cx="3901839" cy="5229965"/>
+          </a:xfrm>
+          <a:prstGeom prst="rect">
+            <a:avLst/>
+          </a:prstGeom>
+        </p:spPr>
+      </p:pic>
+      <p:sp>
+        <p:nvSpPr>
+          <p:cNvPr id="14" name="TextBox 13"/>
+          <p:cNvSpPr txBox="1"/>
+          <p:nvPr/>
+        </p:nvSpPr>
+        <p:spPr>
+          <a:xfrm>
+            <a:off x="3080657" y="3911600"/>
+            <a:ext cx="1397000" cy="369332"/>
+          </a:xfrm>
+          <a:prstGeom prst="rect">
+            <a:avLst/>
+          </a:prstGeom>
+          <a:noFill/>
+        </p:spPr>
+        <p:txBody>
+          <a:bodyPr wrap="square" rtlCol="0">
+            <a:spAutoFit/>
+          </a:bodyPr>
+          <a:lstStyle/>
+          <a:p>
+            <a:r>
+              <a:rPr lang="en-US" dirty="0" smtClean="0"/>
+              <a:t>GND rail</a:t>
+            </a:r>
+            <a:endParaRPr lang="en-US" dirty="0"/>
+          </a:p>
+        </p:txBody>
+      </p:sp>
+      <p:sp>
+        <p:nvSpPr>
+          <p:cNvPr id="15" name="TextBox 14"/>
+          <p:cNvSpPr txBox="1"/>
+          <p:nvPr/>
+        </p:nvSpPr>
+        <p:spPr>
+          <a:xfrm>
+            <a:off x="3080657" y="4657587"/>
+            <a:ext cx="1397000" cy="369332"/>
+          </a:xfrm>
+          <a:prstGeom prst="rect">
+            <a:avLst/>
+          </a:prstGeom>
+          <a:noFill/>
+        </p:spPr>
+        <p:txBody>
+          <a:bodyPr wrap="square" rtlCol="0">
+            <a:spAutoFit/>
+          </a:bodyPr>
+          <a:lstStyle/>
+          <a:p>
+            <a:r>
+              <a:rPr lang="en-US" dirty="0" smtClean="0"/>
+              <a:t>+12 V rail</a:t>
+            </a:r>
+            <a:endParaRPr lang="en-US" dirty="0"/>
+          </a:p>
+        </p:txBody>
+      </p:sp>
+      <p:sp>
+        <p:nvSpPr>
+          <p:cNvPr id="16" name="TextBox 15"/>
+          <p:cNvSpPr txBox="1"/>
+          <p:nvPr/>
+        </p:nvSpPr>
+        <p:spPr>
+          <a:xfrm rot="16200000">
+            <a:off x="4869934" y="2881085"/>
+            <a:ext cx="1397000" cy="369332"/>
+          </a:xfrm>
+          <a:prstGeom prst="rect">
+            <a:avLst/>
+          </a:prstGeom>
+          <a:noFill/>
+        </p:spPr>
+        <p:txBody>
+          <a:bodyPr wrap="square" rtlCol="0">
+            <a:spAutoFit/>
+          </a:bodyPr>
+          <a:lstStyle/>
+          <a:p>
+            <a:r>
+              <a:rPr lang="en-US" dirty="0" smtClean="0"/>
+              <a:t>GND rail</a:t>
+            </a:r>
+            <a:endParaRPr lang="en-US" dirty="0"/>
+          </a:p>
+        </p:txBody>
+      </p:sp>
+      <p:sp>
+        <p:nvSpPr>
+          <p:cNvPr id="17" name="TextBox 16"/>
+          <p:cNvSpPr txBox="1"/>
+          <p:nvPr/>
+        </p:nvSpPr>
+        <p:spPr>
+          <a:xfrm rot="16200000">
+            <a:off x="4107580" y="2941350"/>
+            <a:ext cx="1397000" cy="369332"/>
+          </a:xfrm>
+          <a:prstGeom prst="rect">
+            <a:avLst/>
+          </a:prstGeom>
+          <a:noFill/>
+        </p:spPr>
+        <p:txBody>
+          <a:bodyPr wrap="square" rtlCol="0">
+            <a:spAutoFit/>
+          </a:bodyPr>
+          <a:lstStyle/>
+          <a:p>
+            <a:r>
+              <a:rPr lang="en-US" dirty="0" smtClean="0"/>
+              <a:t>+30 V rail</a:t>
+            </a:r>
+            <a:endParaRPr lang="en-US" dirty="0"/>
+          </a:p>
+        </p:txBody>
+      </p:sp>
+      <p:sp>
+        <p:nvSpPr>
+          <p:cNvPr id="18" name="TextBox 17"/>
+          <p:cNvSpPr txBox="1"/>
+          <p:nvPr/>
+        </p:nvSpPr>
+        <p:spPr>
+          <a:xfrm>
+            <a:off x="5423646" y="1905907"/>
+            <a:ext cx="788468" cy="369332"/>
+          </a:xfrm>
+          <a:prstGeom prst="rect">
+            <a:avLst/>
+          </a:prstGeom>
+          <a:noFill/>
+        </p:spPr>
+        <p:txBody>
+          <a:bodyPr wrap="square" rtlCol="0">
+            <a:spAutoFit/>
+          </a:bodyPr>
+          <a:lstStyle/>
+          <a:p>
+            <a:r>
+              <a:rPr lang="en-US" dirty="0" smtClean="0"/>
+              <a:t>GND</a:t>
+            </a:r>
+            <a:endParaRPr lang="en-US" dirty="0"/>
+          </a:p>
+        </p:txBody>
+      </p:sp>
+      <p:sp>
+        <p:nvSpPr>
+          <p:cNvPr id="19" name="TextBox 18"/>
+          <p:cNvSpPr txBox="1"/>
+          <p:nvPr/>
+        </p:nvSpPr>
+        <p:spPr>
+          <a:xfrm>
+            <a:off x="5423646" y="1444564"/>
+            <a:ext cx="788468" cy="369332"/>
+          </a:xfrm>
+          <a:prstGeom prst="rect">
+            <a:avLst/>
+          </a:prstGeom>
+          <a:noFill/>
+        </p:spPr>
+        <p:txBody>
+          <a:bodyPr wrap="square" rtlCol="0">
+            <a:spAutoFit/>
+          </a:bodyPr>
+          <a:lstStyle/>
+          <a:p>
+            <a:r>
+              <a:rPr lang="en-US" dirty="0" smtClean="0"/>
+              <a:t>+30V</a:t>
+            </a:r>
+            <a:endParaRPr lang="en-US" dirty="0"/>
+          </a:p>
+        </p:txBody>
+      </p:sp>
+      <p:sp>
+        <p:nvSpPr>
+          <p:cNvPr id="20" name="TextBox 19"/>
+          <p:cNvSpPr txBox="1"/>
+          <p:nvPr/>
+        </p:nvSpPr>
+        <p:spPr>
+          <a:xfrm rot="16200000">
+            <a:off x="704335" y="1629230"/>
+            <a:ext cx="1397000" cy="369332"/>
+          </a:xfrm>
+          <a:prstGeom prst="rect">
+            <a:avLst/>
+          </a:prstGeom>
+          <a:noFill/>
+        </p:spPr>
+        <p:txBody>
+          <a:bodyPr wrap="square" rtlCol="0">
+            <a:spAutoFit/>
+          </a:bodyPr>
+          <a:lstStyle/>
+          <a:p>
+            <a:r>
+              <a:rPr lang="en-US" dirty="0" smtClean="0"/>
+              <a:t>30 – 0 – 30</a:t>
+            </a:r>
+            <a:endParaRPr lang="en-US" dirty="0"/>
+          </a:p>
+        </p:txBody>
+      </p:sp>
+      <p:sp>
+        <p:nvSpPr>
+          <p:cNvPr id="21" name="TextBox 20"/>
+          <p:cNvSpPr txBox="1"/>
+          <p:nvPr/>
+        </p:nvSpPr>
+        <p:spPr>
+          <a:xfrm rot="16200000">
+            <a:off x="866681" y="3639850"/>
+            <a:ext cx="819665" cy="369332"/>
+          </a:xfrm>
+          <a:prstGeom prst="rect">
+            <a:avLst/>
+          </a:prstGeom>
+          <a:noFill/>
+        </p:spPr>
+        <p:txBody>
+          <a:bodyPr wrap="square" rtlCol="0">
+            <a:spAutoFit/>
+          </a:bodyPr>
+          <a:lstStyle/>
+          <a:p>
+            <a:r>
+              <a:rPr lang="en-US" dirty="0" smtClean="0"/>
+              <a:t>0 - 12</a:t>
+            </a:r>
+            <a:endParaRPr lang="en-US" dirty="0"/>
+          </a:p>
+        </p:txBody>
+      </p:sp>
+    </p:spTree>
+    <p:extLst>
+      <p:ext uri="{BB962C8B-B14F-4D97-AF65-F5344CB8AC3E}">
+        <p14:creationId xmlns:p14="http://schemas.microsoft.com/office/powerpoint/2010/main" val="573664237"/>
       </p:ext>
     </p:extLst>
   </p:cSld>

</xml_diff>